<commit_message>
introduction & background material
</commit_message>
<xml_diff>
--- a/Manuscripts & Presentations/Introduction Presentation.pptx
+++ b/Manuscripts & Presentations/Introduction Presentation.pptx
@@ -109,6 +109,11 @@
       </a:defRPr>
     </a:lvl9pPr>
   </p:defaultTextStyle>
+  <p:extLst>
+    <p:ext uri="{EFAFB233-063F-42B5-8137-9DF3F51BA10A}">
+      <p15:sldGuideLst xmlns:p15="http://schemas.microsoft.com/office/powerpoint/2012/main"/>
+    </p:ext>
+  </p:extLst>
 </p:presentation>
 </file>
 
@@ -259,7 +264,7 @@
           <a:p>
             <a:fld id="{D17D487A-5351-9D4B-87ED-507969B914B3}" type="datetimeFigureOut">
               <a:rPr lang="en-US" smtClean="0"/>
-              <a:t>9/18/22</a:t>
+              <a:t>9/19/22</a:t>
             </a:fld>
             <a:endParaRPr lang="en-US"/>
           </a:p>
@@ -457,7 +462,7 @@
           <a:p>
             <a:fld id="{D17D487A-5351-9D4B-87ED-507969B914B3}" type="datetimeFigureOut">
               <a:rPr lang="en-US" smtClean="0"/>
-              <a:t>9/18/22</a:t>
+              <a:t>9/19/22</a:t>
             </a:fld>
             <a:endParaRPr lang="en-US"/>
           </a:p>
@@ -665,7 +670,7 @@
           <a:p>
             <a:fld id="{D17D487A-5351-9D4B-87ED-507969B914B3}" type="datetimeFigureOut">
               <a:rPr lang="en-US" smtClean="0"/>
-              <a:t>9/18/22</a:t>
+              <a:t>9/19/22</a:t>
             </a:fld>
             <a:endParaRPr lang="en-US"/>
           </a:p>
@@ -863,7 +868,7 @@
           <a:p>
             <a:fld id="{D17D487A-5351-9D4B-87ED-507969B914B3}" type="datetimeFigureOut">
               <a:rPr lang="en-US" smtClean="0"/>
-              <a:t>9/18/22</a:t>
+              <a:t>9/19/22</a:t>
             </a:fld>
             <a:endParaRPr lang="en-US"/>
           </a:p>
@@ -1138,7 +1143,7 @@
           <a:p>
             <a:fld id="{D17D487A-5351-9D4B-87ED-507969B914B3}" type="datetimeFigureOut">
               <a:rPr lang="en-US" smtClean="0"/>
-              <a:t>9/18/22</a:t>
+              <a:t>9/19/22</a:t>
             </a:fld>
             <a:endParaRPr lang="en-US"/>
           </a:p>
@@ -1403,7 +1408,7 @@
           <a:p>
             <a:fld id="{D17D487A-5351-9D4B-87ED-507969B914B3}" type="datetimeFigureOut">
               <a:rPr lang="en-US" smtClean="0"/>
-              <a:t>9/18/22</a:t>
+              <a:t>9/19/22</a:t>
             </a:fld>
             <a:endParaRPr lang="en-US"/>
           </a:p>
@@ -1815,7 +1820,7 @@
           <a:p>
             <a:fld id="{D17D487A-5351-9D4B-87ED-507969B914B3}" type="datetimeFigureOut">
               <a:rPr lang="en-US" smtClean="0"/>
-              <a:t>9/18/22</a:t>
+              <a:t>9/19/22</a:t>
             </a:fld>
             <a:endParaRPr lang="en-US"/>
           </a:p>
@@ -1956,7 +1961,7 @@
           <a:p>
             <a:fld id="{D17D487A-5351-9D4B-87ED-507969B914B3}" type="datetimeFigureOut">
               <a:rPr lang="en-US" smtClean="0"/>
-              <a:t>9/18/22</a:t>
+              <a:t>9/19/22</a:t>
             </a:fld>
             <a:endParaRPr lang="en-US"/>
           </a:p>
@@ -2069,7 +2074,7 @@
           <a:p>
             <a:fld id="{D17D487A-5351-9D4B-87ED-507969B914B3}" type="datetimeFigureOut">
               <a:rPr lang="en-US" smtClean="0"/>
-              <a:t>9/18/22</a:t>
+              <a:t>9/19/22</a:t>
             </a:fld>
             <a:endParaRPr lang="en-US"/>
           </a:p>
@@ -2380,7 +2385,7 @@
           <a:p>
             <a:fld id="{D17D487A-5351-9D4B-87ED-507969B914B3}" type="datetimeFigureOut">
               <a:rPr lang="en-US" smtClean="0"/>
-              <a:t>9/18/22</a:t>
+              <a:t>9/19/22</a:t>
             </a:fld>
             <a:endParaRPr lang="en-US"/>
           </a:p>
@@ -2668,7 +2673,7 @@
           <a:p>
             <a:fld id="{D17D487A-5351-9D4B-87ED-507969B914B3}" type="datetimeFigureOut">
               <a:rPr lang="en-US" smtClean="0"/>
-              <a:t>9/18/22</a:t>
+              <a:t>9/19/22</a:t>
             </a:fld>
             <a:endParaRPr lang="en-US"/>
           </a:p>
@@ -2909,7 +2914,7 @@
           <a:p>
             <a:fld id="{D17D487A-5351-9D4B-87ED-507969B914B3}" type="datetimeFigureOut">
               <a:rPr lang="en-US" smtClean="0"/>
-              <a:t>9/18/22</a:t>
+              <a:t>9/19/22</a:t>
             </a:fld>
             <a:endParaRPr lang="en-US"/>
           </a:p>
@@ -3522,7 +3527,7 @@
             <a:pPr lvl="1"/>
             <a:r>
               <a:rPr lang="en-US" dirty="0"/>
-              <a:t>Hospital adoption in 2022: &gt;95%</a:t>
+              <a:t>Hospital adoption in 2022: &gt;95% [1]</a:t>
             </a:r>
           </a:p>
           <a:p>
@@ -3562,8 +3567,66 @@
             <a:pPr lvl="1"/>
             <a:r>
               <a:rPr lang="en-US" dirty="0"/>
-              <a:t>5% had to re-do a test due to unavailability of prior results</a:t>
-            </a:r>
+              <a:t>5% had to re-do a test due to unavailability of prior results [2]</a:t>
+            </a:r>
+          </a:p>
+        </p:txBody>
+      </p:sp>
+      <p:sp>
+        <p:nvSpPr>
+          <p:cNvPr id="4" name="TextBox 3">
+            <a:extLst>
+              <a:ext uri="{FF2B5EF4-FFF2-40B4-BE49-F238E27FC236}">
+                <a16:creationId xmlns:a16="http://schemas.microsoft.com/office/drawing/2014/main" id="{E08FD4AB-C3A9-9B0E-7CC6-07B789FB0FBC}"/>
+              </a:ext>
+            </a:extLst>
+          </p:cNvPr>
+          <p:cNvSpPr txBox="1"/>
+          <p:nvPr/>
+        </p:nvSpPr>
+        <p:spPr>
+          <a:xfrm>
+            <a:off x="637953" y="6176963"/>
+            <a:ext cx="11313042" cy="646331"/>
+          </a:xfrm>
+          <a:prstGeom prst="rect">
+            <a:avLst/>
+          </a:prstGeom>
+          <a:noFill/>
+        </p:spPr>
+        <p:txBody>
+          <a:bodyPr wrap="square" rtlCol="0">
+            <a:spAutoFit/>
+          </a:bodyPr>
+          <a:lstStyle/>
+          <a:p>
+            <a:r>
+              <a:rPr lang="en-US" dirty="0"/>
+              <a:t>[1] : </a:t>
+            </a:r>
+            <a:r>
+              <a:rPr lang="en-US" dirty="0">
+                <a:effectLst/>
+                <a:hlinkClick r:id="rId2"/>
+              </a:rPr>
+              <a:t>https://www.ncbi.nlm.nih.gov/pmc/articles/PMC5565131/</a:t>
+            </a:r>
+            <a:endParaRPr lang="en-US" dirty="0">
+              <a:effectLst/>
+            </a:endParaRPr>
+          </a:p>
+          <a:p>
+            <a:r>
+              <a:rPr lang="en-US" dirty="0"/>
+              <a:t>[2] : </a:t>
+            </a:r>
+            <a:r>
+              <a:rPr lang="en-US" dirty="0">
+                <a:hlinkClick r:id="rId3"/>
+              </a:rPr>
+              <a:t>https://journals.sagepub.com/doi/10.1177/1460458218769699</a:t>
+            </a:r>
+            <a:endParaRPr lang="en-US" dirty="0"/>
           </a:p>
         </p:txBody>
       </p:sp>

</xml_diff>